<commit_message>
added hidden slides to pdf
</commit_message>
<xml_diff>
--- a/Azure Databricks.pptx
+++ b/Azure Databricks.pptx
@@ -147,6 +147,7 @@
 <p1510:revInfo xmlns:a="http://schemas.openxmlformats.org/drawingml/2006/main" xmlns:r="http://schemas.openxmlformats.org/officeDocument/2006/relationships" xmlns:p1510="http://schemas.microsoft.com/office/powerpoint/2015/10/main">
   <p1510:revLst>
     <p1510:client id="{93A1AC7C-E473-4F18-92DE-55DB6D21CC42}" v="2" dt="2024-01-14T12:18:17.316"/>
+    <p1510:client id="{9E666C02-7B5B-4322-86F7-622E6765069A}" v="4" dt="2024-01-14T14:14:45.111"/>
   </p1510:revLst>
 </p1510:revInfo>
 </file>
@@ -4010,6 +4011,138 @@
             <ac:picMk id="7" creationId="{B9555FCE-14DB-1B75-ACD7-E4C426ABC467}"/>
           </ac:picMkLst>
         </pc:picChg>
+      </pc:sldChg>
+    </pc:docChg>
+  </pc:docChgLst>
+  <pc:docChgLst>
+    <pc:chgData name="Linus Szokody" userId="040e720b-db52-4dea-86c8-045d0feb53b3" providerId="ADAL" clId="{9E666C02-7B5B-4322-86F7-622E6765069A}"/>
+    <pc:docChg chg="modSld">
+      <pc:chgData name="Linus Szokody" userId="040e720b-db52-4dea-86c8-045d0feb53b3" providerId="ADAL" clId="{9E666C02-7B5B-4322-86F7-622E6765069A}" dt="2024-01-14T14:15:13.145" v="8" actId="729"/>
+      <pc:docMkLst>
+        <pc:docMk/>
+      </pc:docMkLst>
+      <pc:sldChg chg="mod modShow">
+        <pc:chgData name="Linus Szokody" userId="040e720b-db52-4dea-86c8-045d0feb53b3" providerId="ADAL" clId="{9E666C02-7B5B-4322-86F7-622E6765069A}" dt="2024-01-14T14:15:13.145" v="8" actId="729"/>
+        <pc:sldMkLst>
+          <pc:docMk/>
+          <pc:sldMk cId="4076757499" sldId="273"/>
+        </pc:sldMkLst>
+      </pc:sldChg>
+      <pc:sldChg chg="mod modShow">
+        <pc:chgData name="Linus Szokody" userId="040e720b-db52-4dea-86c8-045d0feb53b3" providerId="ADAL" clId="{9E666C02-7B5B-4322-86F7-622E6765069A}" dt="2024-01-14T14:15:13.145" v="8" actId="729"/>
+        <pc:sldMkLst>
+          <pc:docMk/>
+          <pc:sldMk cId="3955633240" sldId="275"/>
+        </pc:sldMkLst>
+      </pc:sldChg>
+      <pc:sldChg chg="mod modShow">
+        <pc:chgData name="Linus Szokody" userId="040e720b-db52-4dea-86c8-045d0feb53b3" providerId="ADAL" clId="{9E666C02-7B5B-4322-86F7-622E6765069A}" dt="2024-01-14T14:15:13.145" v="8" actId="729"/>
+        <pc:sldMkLst>
+          <pc:docMk/>
+          <pc:sldMk cId="3601799609" sldId="276"/>
+        </pc:sldMkLst>
+      </pc:sldChg>
+      <pc:sldChg chg="mod modShow">
+        <pc:chgData name="Linus Szokody" userId="040e720b-db52-4dea-86c8-045d0feb53b3" providerId="ADAL" clId="{9E666C02-7B5B-4322-86F7-622E6765069A}" dt="2024-01-14T14:15:04.095" v="6" actId="729"/>
+        <pc:sldMkLst>
+          <pc:docMk/>
+          <pc:sldMk cId="2515823078" sldId="305"/>
+        </pc:sldMkLst>
+      </pc:sldChg>
+      <pc:sldChg chg="mod modShow">
+        <pc:chgData name="Linus Szokody" userId="040e720b-db52-4dea-86c8-045d0feb53b3" providerId="ADAL" clId="{9E666C02-7B5B-4322-86F7-622E6765069A}" dt="2024-01-14T14:15:08.461" v="7" actId="729"/>
+        <pc:sldMkLst>
+          <pc:docMk/>
+          <pc:sldMk cId="3137454884" sldId="310"/>
+        </pc:sldMkLst>
+      </pc:sldChg>
+      <pc:sldChg chg="mod modShow">
+        <pc:chgData name="Linus Szokody" userId="040e720b-db52-4dea-86c8-045d0feb53b3" providerId="ADAL" clId="{9E666C02-7B5B-4322-86F7-622E6765069A}" dt="2024-01-14T14:15:04.095" v="6" actId="729"/>
+        <pc:sldMkLst>
+          <pc:docMk/>
+          <pc:sldMk cId="2805493421" sldId="311"/>
+        </pc:sldMkLst>
+      </pc:sldChg>
+      <pc:sldChg chg="mod modShow">
+        <pc:chgData name="Linus Szokody" userId="040e720b-db52-4dea-86c8-045d0feb53b3" providerId="ADAL" clId="{9E666C02-7B5B-4322-86F7-622E6765069A}" dt="2024-01-14T14:14:50.744" v="4" actId="729"/>
+        <pc:sldMkLst>
+          <pc:docMk/>
+          <pc:sldMk cId="2980732391" sldId="313"/>
+        </pc:sldMkLst>
+      </pc:sldChg>
+      <pc:sldChg chg="mod modShow">
+        <pc:chgData name="Linus Szokody" userId="040e720b-db52-4dea-86c8-045d0feb53b3" providerId="ADAL" clId="{9E666C02-7B5B-4322-86F7-622E6765069A}" dt="2024-01-14T14:15:04.095" v="6" actId="729"/>
+        <pc:sldMkLst>
+          <pc:docMk/>
+          <pc:sldMk cId="3061529482" sldId="314"/>
+        </pc:sldMkLst>
+      </pc:sldChg>
+      <pc:sldChg chg="mod modShow">
+        <pc:chgData name="Linus Szokody" userId="040e720b-db52-4dea-86c8-045d0feb53b3" providerId="ADAL" clId="{9E666C02-7B5B-4322-86F7-622E6765069A}" dt="2024-01-14T14:15:04.095" v="6" actId="729"/>
+        <pc:sldMkLst>
+          <pc:docMk/>
+          <pc:sldMk cId="2288489653" sldId="319"/>
+        </pc:sldMkLst>
+      </pc:sldChg>
+      <pc:sldChg chg="addSp modSp mod modShow">
+        <pc:chgData name="Linus Szokody" userId="040e720b-db52-4dea-86c8-045d0feb53b3" providerId="ADAL" clId="{9E666C02-7B5B-4322-86F7-622E6765069A}" dt="2024-01-14T14:15:04.095" v="6" actId="729"/>
+        <pc:sldMkLst>
+          <pc:docMk/>
+          <pc:sldMk cId="4219334631" sldId="323"/>
+        </pc:sldMkLst>
+        <pc:spChg chg="add mod">
+          <ac:chgData name="Linus Szokody" userId="040e720b-db52-4dea-86c8-045d0feb53b3" providerId="ADAL" clId="{9E666C02-7B5B-4322-86F7-622E6765069A}" dt="2024-01-14T14:14:41.426" v="0"/>
+          <ac:spMkLst>
+            <pc:docMk/>
+            <pc:sldMk cId="4219334631" sldId="323"/>
+            <ac:spMk id="4" creationId="{BB3FCD5A-FF8C-FFCF-CB5F-C5080C3B524A}"/>
+          </ac:spMkLst>
+        </pc:spChg>
+      </pc:sldChg>
+      <pc:sldChg chg="addSp modSp mod modShow">
+        <pc:chgData name="Linus Szokody" userId="040e720b-db52-4dea-86c8-045d0feb53b3" providerId="ADAL" clId="{9E666C02-7B5B-4322-86F7-622E6765069A}" dt="2024-01-14T14:15:04.095" v="6" actId="729"/>
+        <pc:sldMkLst>
+          <pc:docMk/>
+          <pc:sldMk cId="3838069317" sldId="324"/>
+        </pc:sldMkLst>
+        <pc:spChg chg="add mod">
+          <ac:chgData name="Linus Szokody" userId="040e720b-db52-4dea-86c8-045d0feb53b3" providerId="ADAL" clId="{9E666C02-7B5B-4322-86F7-622E6765069A}" dt="2024-01-14T14:14:42.369" v="1"/>
+          <ac:spMkLst>
+            <pc:docMk/>
+            <pc:sldMk cId="3838069317" sldId="324"/>
+            <ac:spMk id="6" creationId="{2042C626-42B2-025B-8AA0-4A52F728499C}"/>
+          </ac:spMkLst>
+        </pc:spChg>
+      </pc:sldChg>
+      <pc:sldChg chg="addSp modSp mod modShow">
+        <pc:chgData name="Linus Szokody" userId="040e720b-db52-4dea-86c8-045d0feb53b3" providerId="ADAL" clId="{9E666C02-7B5B-4322-86F7-622E6765069A}" dt="2024-01-14T14:15:04.095" v="6" actId="729"/>
+        <pc:sldMkLst>
+          <pc:docMk/>
+          <pc:sldMk cId="923563772" sldId="325"/>
+        </pc:sldMkLst>
+        <pc:spChg chg="add mod">
+          <ac:chgData name="Linus Szokody" userId="040e720b-db52-4dea-86c8-045d0feb53b3" providerId="ADAL" clId="{9E666C02-7B5B-4322-86F7-622E6765069A}" dt="2024-01-14T14:14:43.768" v="2"/>
+          <ac:spMkLst>
+            <pc:docMk/>
+            <pc:sldMk cId="923563772" sldId="325"/>
+            <ac:spMk id="4" creationId="{5B162037-FA7E-75CF-957A-6456627D7DFC}"/>
+          </ac:spMkLst>
+        </pc:spChg>
+      </pc:sldChg>
+      <pc:sldChg chg="addSp modSp mod modShow">
+        <pc:chgData name="Linus Szokody" userId="040e720b-db52-4dea-86c8-045d0feb53b3" providerId="ADAL" clId="{9E666C02-7B5B-4322-86F7-622E6765069A}" dt="2024-01-14T14:14:55.165" v="5" actId="729"/>
+        <pc:sldMkLst>
+          <pc:docMk/>
+          <pc:sldMk cId="2814892956" sldId="326"/>
+        </pc:sldMkLst>
+        <pc:spChg chg="add mod">
+          <ac:chgData name="Linus Szokody" userId="040e720b-db52-4dea-86c8-045d0feb53b3" providerId="ADAL" clId="{9E666C02-7B5B-4322-86F7-622E6765069A}" dt="2024-01-14T14:14:45.111" v="3"/>
+          <ac:spMkLst>
+            <pc:docMk/>
+            <pc:sldMk cId="2814892956" sldId="326"/>
+            <ac:spMk id="4" creationId="{5EBB96B0-9ED4-D850-82F7-7E8F349846E6}"/>
+          </ac:spMkLst>
+        </pc:spChg>
       </pc:sldChg>
     </pc:docChg>
   </pc:docChgLst>
@@ -11090,7 +11223,7 @@
 </file>
 
 <file path=ppt/slides/slide11.xml><?xml version="1.0" encoding="utf-8"?>
-<p:sld xmlns:a="http://schemas.openxmlformats.org/drawingml/2006/main" xmlns:r="http://schemas.openxmlformats.org/officeDocument/2006/relationships" xmlns:p="http://schemas.openxmlformats.org/presentationml/2006/main" show="0">
+<p:sld xmlns:a="http://schemas.openxmlformats.org/drawingml/2006/main" xmlns:r="http://schemas.openxmlformats.org/officeDocument/2006/relationships" xmlns:p="http://schemas.openxmlformats.org/presentationml/2006/main">
   <p:cSld>
     <p:spTree>
       <p:nvGrpSpPr>
@@ -12827,7 +12960,7 @@
 </file>
 
 <file path=ppt/slides/slide14.xml><?xml version="1.0" encoding="utf-8"?>
-<p:sld xmlns:a="http://schemas.openxmlformats.org/drawingml/2006/main" xmlns:r="http://schemas.openxmlformats.org/officeDocument/2006/relationships" xmlns:p="http://schemas.openxmlformats.org/presentationml/2006/main" show="0">
+<p:sld xmlns:a="http://schemas.openxmlformats.org/drawingml/2006/main" xmlns:r="http://schemas.openxmlformats.org/officeDocument/2006/relationships" xmlns:p="http://schemas.openxmlformats.org/presentationml/2006/main">
   <p:cSld>
     <p:spTree>
       <p:nvGrpSpPr>
@@ -13480,7 +13613,7 @@
 </file>
 
 <file path=ppt/slides/slide15.xml><?xml version="1.0" encoding="utf-8"?>
-<p:sld xmlns:a="http://schemas.openxmlformats.org/drawingml/2006/main" xmlns:r="http://schemas.openxmlformats.org/officeDocument/2006/relationships" xmlns:p="http://schemas.openxmlformats.org/presentationml/2006/main" show="0">
+<p:sld xmlns:a="http://schemas.openxmlformats.org/drawingml/2006/main" xmlns:r="http://schemas.openxmlformats.org/officeDocument/2006/relationships" xmlns:p="http://schemas.openxmlformats.org/presentationml/2006/main">
   <p:cSld>
     <p:spTree>
       <p:nvGrpSpPr>
@@ -13835,7 +13968,7 @@
 </file>
 
 <file path=ppt/slides/slide16.xml><?xml version="1.0" encoding="utf-8"?>
-<p:sld xmlns:a="http://schemas.openxmlformats.org/drawingml/2006/main" xmlns:r="http://schemas.openxmlformats.org/officeDocument/2006/relationships" xmlns:p="http://schemas.openxmlformats.org/presentationml/2006/main" show="0">
+<p:sld xmlns:a="http://schemas.openxmlformats.org/drawingml/2006/main" xmlns:r="http://schemas.openxmlformats.org/officeDocument/2006/relationships" xmlns:p="http://schemas.openxmlformats.org/presentationml/2006/main">
   <p:cSld>
     <p:spTree>
       <p:nvGrpSpPr>
@@ -14150,7 +14283,7 @@
 </file>
 
 <file path=ppt/slides/slide17.xml><?xml version="1.0" encoding="utf-8"?>
-<p:sld xmlns:a="http://schemas.openxmlformats.org/drawingml/2006/main" xmlns:r="http://schemas.openxmlformats.org/officeDocument/2006/relationships" xmlns:p="http://schemas.openxmlformats.org/presentationml/2006/main" show="0">
+<p:sld xmlns:a="http://schemas.openxmlformats.org/drawingml/2006/main" xmlns:r="http://schemas.openxmlformats.org/officeDocument/2006/relationships" xmlns:p="http://schemas.openxmlformats.org/presentationml/2006/main">
   <p:cSld>
     <p:spTree>
       <p:nvGrpSpPr>
@@ -14317,7 +14450,7 @@
 </file>
 
 <file path=ppt/slides/slide18.xml><?xml version="1.0" encoding="utf-8"?>
-<p:sld xmlns:a="http://schemas.openxmlformats.org/drawingml/2006/main" xmlns:r="http://schemas.openxmlformats.org/officeDocument/2006/relationships" xmlns:p="http://schemas.openxmlformats.org/presentationml/2006/main" show="0">
+<p:sld xmlns:a="http://schemas.openxmlformats.org/drawingml/2006/main" xmlns:r="http://schemas.openxmlformats.org/officeDocument/2006/relationships" xmlns:p="http://schemas.openxmlformats.org/presentationml/2006/main">
   <p:cSld>
     <p:spTree>
       <p:nvGrpSpPr>
@@ -14612,6 +14745,60 @@
           </a:prstGeom>
         </p:spPr>
       </p:pic>
+      <p:sp>
+        <p:nvSpPr>
+          <p:cNvPr id="4" name="Rectangle 3">
+            <a:extLst>
+              <a:ext uri="{FF2B5EF4-FFF2-40B4-BE49-F238E27FC236}">
+                <a16:creationId xmlns:a16="http://schemas.microsoft.com/office/drawing/2014/main" id="{BB3FCD5A-FF8C-FFCF-CB5F-C5080C3B524A}"/>
+              </a:ext>
+            </a:extLst>
+          </p:cNvPr>
+          <p:cNvSpPr/>
+          <p:nvPr/>
+        </p:nvSpPr>
+        <p:spPr>
+          <a:xfrm>
+            <a:off x="147711" y="133643"/>
+            <a:ext cx="1674055" cy="372794"/>
+          </a:xfrm>
+          <a:prstGeom prst="rect">
+            <a:avLst/>
+          </a:prstGeom>
+        </p:spPr>
+        <p:style>
+          <a:lnRef idx="2">
+            <a:schemeClr val="accent1">
+              <a:shade val="15000"/>
+            </a:schemeClr>
+          </a:lnRef>
+          <a:fillRef idx="1">
+            <a:schemeClr val="accent1"/>
+          </a:fillRef>
+          <a:effectRef idx="0">
+            <a:schemeClr val="accent1"/>
+          </a:effectRef>
+          <a:fontRef idx="minor">
+            <a:schemeClr val="lt1"/>
+          </a:fontRef>
+        </p:style>
+        <p:txBody>
+          <a:bodyPr rtlCol="0" anchor="ctr"/>
+          <a:lstStyle/>
+          <a:p>
+            <a:pPr algn="ctr"/>
+            <a:r>
+              <a:rPr lang="de-DE" dirty="0"/>
+              <a:t>D</a:t>
+            </a:r>
+            <a:r>
+              <a:rPr lang="en-CH" dirty="0"/>
+              <a:t>o not present</a:t>
+            </a:r>
+            <a:endParaRPr lang="de-DE" dirty="0"/>
+          </a:p>
+        </p:txBody>
+      </p:sp>
     </p:spTree>
     <p:extLst>
       <p:ext uri="{BB962C8B-B14F-4D97-AF65-F5344CB8AC3E}">
@@ -14626,7 +14813,7 @@
 </file>
 
 <file path=ppt/slides/slide19.xml><?xml version="1.0" encoding="utf-8"?>
-<p:sld xmlns:a="http://schemas.openxmlformats.org/drawingml/2006/main" xmlns:r="http://schemas.openxmlformats.org/officeDocument/2006/relationships" xmlns:p="http://schemas.openxmlformats.org/presentationml/2006/main" show="0">
+<p:sld xmlns:a="http://schemas.openxmlformats.org/drawingml/2006/main" xmlns:r="http://schemas.openxmlformats.org/officeDocument/2006/relationships" xmlns:p="http://schemas.openxmlformats.org/presentationml/2006/main">
   <p:cSld>
     <p:spTree>
       <p:nvGrpSpPr>
@@ -15413,6 +15600,60 @@
           </a:p>
         </p:txBody>
       </p:sp>
+      <p:sp>
+        <p:nvSpPr>
+          <p:cNvPr id="6" name="Rectangle 5">
+            <a:extLst>
+              <a:ext uri="{FF2B5EF4-FFF2-40B4-BE49-F238E27FC236}">
+                <a16:creationId xmlns:a16="http://schemas.microsoft.com/office/drawing/2014/main" id="{2042C626-42B2-025B-8AA0-4A52F728499C}"/>
+              </a:ext>
+            </a:extLst>
+          </p:cNvPr>
+          <p:cNvSpPr/>
+          <p:nvPr/>
+        </p:nvSpPr>
+        <p:spPr>
+          <a:xfrm>
+            <a:off x="147711" y="133643"/>
+            <a:ext cx="1674055" cy="372794"/>
+          </a:xfrm>
+          <a:prstGeom prst="rect">
+            <a:avLst/>
+          </a:prstGeom>
+        </p:spPr>
+        <p:style>
+          <a:lnRef idx="2">
+            <a:schemeClr val="accent1">
+              <a:shade val="15000"/>
+            </a:schemeClr>
+          </a:lnRef>
+          <a:fillRef idx="1">
+            <a:schemeClr val="accent1"/>
+          </a:fillRef>
+          <a:effectRef idx="0">
+            <a:schemeClr val="accent1"/>
+          </a:effectRef>
+          <a:fontRef idx="minor">
+            <a:schemeClr val="lt1"/>
+          </a:fontRef>
+        </p:style>
+        <p:txBody>
+          <a:bodyPr rtlCol="0" anchor="ctr"/>
+          <a:lstStyle/>
+          <a:p>
+            <a:pPr algn="ctr"/>
+            <a:r>
+              <a:rPr lang="de-DE" dirty="0"/>
+              <a:t>D</a:t>
+            </a:r>
+            <a:r>
+              <a:rPr lang="en-CH" dirty="0"/>
+              <a:t>o not present</a:t>
+            </a:r>
+            <a:endParaRPr lang="de-DE" dirty="0"/>
+          </a:p>
+        </p:txBody>
+      </p:sp>
     </p:spTree>
     <p:extLst>
       <p:ext uri="{BB962C8B-B14F-4D97-AF65-F5344CB8AC3E}">
@@ -15602,7 +15843,7 @@
 </file>
 
 <file path=ppt/slides/slide20.xml><?xml version="1.0" encoding="utf-8"?>
-<p:sld xmlns:a="http://schemas.openxmlformats.org/drawingml/2006/main" xmlns:r="http://schemas.openxmlformats.org/officeDocument/2006/relationships" xmlns:p="http://schemas.openxmlformats.org/presentationml/2006/main" show="0">
+<p:sld xmlns:a="http://schemas.openxmlformats.org/drawingml/2006/main" xmlns:r="http://schemas.openxmlformats.org/officeDocument/2006/relationships" xmlns:p="http://schemas.openxmlformats.org/presentationml/2006/main">
   <p:cSld>
     <p:spTree>
       <p:nvGrpSpPr>
@@ -15791,6 +16032,60 @@
           </a:prstGeom>
         </p:spPr>
       </p:pic>
+      <p:sp>
+        <p:nvSpPr>
+          <p:cNvPr id="4" name="Rectangle 3">
+            <a:extLst>
+              <a:ext uri="{FF2B5EF4-FFF2-40B4-BE49-F238E27FC236}">
+                <a16:creationId xmlns:a16="http://schemas.microsoft.com/office/drawing/2014/main" id="{5B162037-FA7E-75CF-957A-6456627D7DFC}"/>
+              </a:ext>
+            </a:extLst>
+          </p:cNvPr>
+          <p:cNvSpPr/>
+          <p:nvPr/>
+        </p:nvSpPr>
+        <p:spPr>
+          <a:xfrm>
+            <a:off x="147711" y="133643"/>
+            <a:ext cx="1674055" cy="372794"/>
+          </a:xfrm>
+          <a:prstGeom prst="rect">
+            <a:avLst/>
+          </a:prstGeom>
+        </p:spPr>
+        <p:style>
+          <a:lnRef idx="2">
+            <a:schemeClr val="accent1">
+              <a:shade val="15000"/>
+            </a:schemeClr>
+          </a:lnRef>
+          <a:fillRef idx="1">
+            <a:schemeClr val="accent1"/>
+          </a:fillRef>
+          <a:effectRef idx="0">
+            <a:schemeClr val="accent1"/>
+          </a:effectRef>
+          <a:fontRef idx="minor">
+            <a:schemeClr val="lt1"/>
+          </a:fontRef>
+        </p:style>
+        <p:txBody>
+          <a:bodyPr rtlCol="0" anchor="ctr"/>
+          <a:lstStyle/>
+          <a:p>
+            <a:pPr algn="ctr"/>
+            <a:r>
+              <a:rPr lang="de-DE" dirty="0"/>
+              <a:t>D</a:t>
+            </a:r>
+            <a:r>
+              <a:rPr lang="en-CH" dirty="0"/>
+              <a:t>o not present</a:t>
+            </a:r>
+            <a:endParaRPr lang="de-DE" dirty="0"/>
+          </a:p>
+        </p:txBody>
+      </p:sp>
     </p:spTree>
     <p:extLst>
       <p:ext uri="{BB962C8B-B14F-4D97-AF65-F5344CB8AC3E}">
@@ -16610,7 +16905,7 @@
 </file>
 
 <file path=ppt/slides/slide22.xml><?xml version="1.0" encoding="utf-8"?>
-<p:sld xmlns:a="http://schemas.openxmlformats.org/drawingml/2006/main" xmlns:r="http://schemas.openxmlformats.org/officeDocument/2006/relationships" xmlns:p="http://schemas.openxmlformats.org/presentationml/2006/main" show="0">
+<p:sld xmlns:a="http://schemas.openxmlformats.org/drawingml/2006/main" xmlns:r="http://schemas.openxmlformats.org/officeDocument/2006/relationships" xmlns:p="http://schemas.openxmlformats.org/presentationml/2006/main">
   <p:cSld>
     <p:spTree>
       <p:nvGrpSpPr>
@@ -16792,6 +17087,60 @@
           </a:prstGeom>
         </p:spPr>
       </p:pic>
+      <p:sp>
+        <p:nvSpPr>
+          <p:cNvPr id="4" name="Rectangle 3">
+            <a:extLst>
+              <a:ext uri="{FF2B5EF4-FFF2-40B4-BE49-F238E27FC236}">
+                <a16:creationId xmlns:a16="http://schemas.microsoft.com/office/drawing/2014/main" id="{5EBB96B0-9ED4-D850-82F7-7E8F349846E6}"/>
+              </a:ext>
+            </a:extLst>
+          </p:cNvPr>
+          <p:cNvSpPr/>
+          <p:nvPr/>
+        </p:nvSpPr>
+        <p:spPr>
+          <a:xfrm>
+            <a:off x="147711" y="133643"/>
+            <a:ext cx="1674055" cy="372794"/>
+          </a:xfrm>
+          <a:prstGeom prst="rect">
+            <a:avLst/>
+          </a:prstGeom>
+        </p:spPr>
+        <p:style>
+          <a:lnRef idx="2">
+            <a:schemeClr val="accent1">
+              <a:shade val="15000"/>
+            </a:schemeClr>
+          </a:lnRef>
+          <a:fillRef idx="1">
+            <a:schemeClr val="accent1"/>
+          </a:fillRef>
+          <a:effectRef idx="0">
+            <a:schemeClr val="accent1"/>
+          </a:effectRef>
+          <a:fontRef idx="minor">
+            <a:schemeClr val="lt1"/>
+          </a:fontRef>
+        </p:style>
+        <p:txBody>
+          <a:bodyPr rtlCol="0" anchor="ctr"/>
+          <a:lstStyle/>
+          <a:p>
+            <a:pPr algn="ctr"/>
+            <a:r>
+              <a:rPr lang="de-DE" dirty="0"/>
+              <a:t>D</a:t>
+            </a:r>
+            <a:r>
+              <a:rPr lang="en-CH" dirty="0"/>
+              <a:t>o not present</a:t>
+            </a:r>
+            <a:endParaRPr lang="de-DE" dirty="0"/>
+          </a:p>
+        </p:txBody>
+      </p:sp>
     </p:spTree>
     <p:extLst>
       <p:ext uri="{BB962C8B-B14F-4D97-AF65-F5344CB8AC3E}">
@@ -18815,7 +19164,7 @@
 </file>
 
 <file path=ppt/slides/slide26.xml><?xml version="1.0" encoding="utf-8"?>
-<p:sld xmlns:a="http://schemas.openxmlformats.org/drawingml/2006/main" xmlns:r="http://schemas.openxmlformats.org/officeDocument/2006/relationships" xmlns:p="http://schemas.openxmlformats.org/presentationml/2006/main" show="0">
+<p:sld xmlns:a="http://schemas.openxmlformats.org/drawingml/2006/main" xmlns:r="http://schemas.openxmlformats.org/officeDocument/2006/relationships" xmlns:p="http://schemas.openxmlformats.org/presentationml/2006/main">
   <p:cSld>
     <p:spTree>
       <p:nvGrpSpPr>
@@ -21165,7 +21514,7 @@
 </file>
 
 <file path=ppt/slides/slide6.xml><?xml version="1.0" encoding="utf-8"?>
-<p:sld xmlns:a="http://schemas.openxmlformats.org/drawingml/2006/main" xmlns:r="http://schemas.openxmlformats.org/officeDocument/2006/relationships" xmlns:p="http://schemas.openxmlformats.org/presentationml/2006/main" show="0">
+<p:sld xmlns:a="http://schemas.openxmlformats.org/drawingml/2006/main" xmlns:r="http://schemas.openxmlformats.org/officeDocument/2006/relationships" xmlns:p="http://schemas.openxmlformats.org/presentationml/2006/main">
   <p:cSld>
     <p:spTree>
       <p:nvGrpSpPr>
@@ -21670,7 +22019,7 @@
 </file>
 
 <file path=ppt/slides/slide7.xml><?xml version="1.0" encoding="utf-8"?>
-<p:sld xmlns:a="http://schemas.openxmlformats.org/drawingml/2006/main" xmlns:r="http://schemas.openxmlformats.org/officeDocument/2006/relationships" xmlns:p="http://schemas.openxmlformats.org/presentationml/2006/main" show="0">
+<p:sld xmlns:a="http://schemas.openxmlformats.org/drawingml/2006/main" xmlns:r="http://schemas.openxmlformats.org/officeDocument/2006/relationships" xmlns:p="http://schemas.openxmlformats.org/presentationml/2006/main">
   <p:cSld>
     <p:spTree>
       <p:nvGrpSpPr>
@@ -21876,7 +22225,7 @@
 </file>
 
 <file path=ppt/slides/slide8.xml><?xml version="1.0" encoding="utf-8"?>
-<p:sld xmlns:a="http://schemas.openxmlformats.org/drawingml/2006/main" xmlns:r="http://schemas.openxmlformats.org/officeDocument/2006/relationships" xmlns:p="http://schemas.openxmlformats.org/presentationml/2006/main" show="0">
+<p:sld xmlns:a="http://schemas.openxmlformats.org/drawingml/2006/main" xmlns:r="http://schemas.openxmlformats.org/officeDocument/2006/relationships" xmlns:p="http://schemas.openxmlformats.org/presentationml/2006/main">
   <p:cSld>
     <p:spTree>
       <p:nvGrpSpPr>
@@ -23713,6 +24062,15 @@
 </file>
 
 <file path=customXml/item2.xml><?xml version="1.0" encoding="utf-8"?>
+<?mso-contentType ?>
+<FormTemplates xmlns="http://schemas.microsoft.com/sharepoint/v3/contenttype/forms">
+  <Display>DocumentLibraryForm</Display>
+  <Edit>DocumentLibraryForm</Edit>
+  <New>DocumentLibraryForm</New>
+</FormTemplates>
+</file>
+
+<file path=customXml/item3.xml><?xml version="1.0" encoding="utf-8"?>
 <ct:contentTypeSchema xmlns:ct="http://schemas.microsoft.com/office/2006/metadata/contentType" xmlns:ma="http://schemas.microsoft.com/office/2006/metadata/properties/metaAttributes" ct:_="" ma:_="" ma:contentTypeName="Dokument" ma:contentTypeID="0x010100291C80A87678024D899C866B7304932C" ma:contentTypeVersion="11" ma:contentTypeDescription="Ein neues Dokument erstellen." ma:contentTypeScope="" ma:versionID="65dda4300b2f11ea387728a638cd362d">
   <xsd:schema xmlns:xsd="http://www.w3.org/2001/XMLSchema" xmlns:xs="http://www.w3.org/2001/XMLSchema" xmlns:p="http://schemas.microsoft.com/office/2006/metadata/properties" xmlns:ns2="fcd0a8dd-aa68-48b7-9764-2e99e20aa1cb" xmlns:ns3="129ddf54-de38-4828-b8ab-878fdb42dfca" targetNamespace="http://schemas.microsoft.com/office/2006/metadata/properties" ma:root="true" ma:fieldsID="ac213f98ad72fd6ba2b21177385b6bd7" ns2:_="" ns3:_="">
     <xsd:import namespace="fcd0a8dd-aa68-48b7-9764-2e99e20aa1cb"/>
@@ -23907,15 +24265,6 @@
 </ct:contentTypeSchema>
 </file>
 
-<file path=customXml/item3.xml><?xml version="1.0" encoding="utf-8"?>
-<?mso-contentType ?>
-<FormTemplates xmlns="http://schemas.microsoft.com/sharepoint/v3/contenttype/forms">
-  <Display>DocumentLibraryForm</Display>
-  <Edit>DocumentLibraryForm</Edit>
-  <New>DocumentLibraryForm</New>
-</FormTemplates>
-</file>
-
 <file path=customXml/itemProps1.xml><?xml version="1.0" encoding="utf-8"?>
 <ds:datastoreItem xmlns:ds="http://schemas.openxmlformats.org/officeDocument/2006/customXml" ds:itemID="{3D3D2E07-62E1-4115-AC7A-749FDA414DE7}">
   <ds:schemaRefs>
@@ -23934,6 +24283,14 @@
 </file>
 
 <file path=customXml/itemProps2.xml><?xml version="1.0" encoding="utf-8"?>
+<ds:datastoreItem xmlns:ds="http://schemas.openxmlformats.org/officeDocument/2006/customXml" ds:itemID="{97C720D6-3A36-4E56-8316-CFCC360C042B}">
+  <ds:schemaRefs>
+    <ds:schemaRef ds:uri="http://schemas.microsoft.com/sharepoint/v3/contenttype/forms"/>
+  </ds:schemaRefs>
+</ds:datastoreItem>
+</file>
+
+<file path=customXml/itemProps3.xml><?xml version="1.0" encoding="utf-8"?>
 <ds:datastoreItem xmlns:ds="http://schemas.openxmlformats.org/officeDocument/2006/customXml" ds:itemID="{C946DD0A-8715-46C1-AA82-0CFF1357BF42}">
   <ds:schemaRefs>
     <ds:schemaRef ds:uri="http://schemas.microsoft.com/office/2006/metadata/contentType"/>
@@ -23950,12 +24307,4 @@
     <ds:schemaRef ds:uri="http://schemas.microsoft.com/internal/obd"/>
   </ds:schemaRefs>
 </ds:datastoreItem>
-</file>
-
-<file path=customXml/itemProps3.xml><?xml version="1.0" encoding="utf-8"?>
-<ds:datastoreItem xmlns:ds="http://schemas.openxmlformats.org/officeDocument/2006/customXml" ds:itemID="{97C720D6-3A36-4E56-8316-CFCC360C042B}">
-  <ds:schemaRefs>
-    <ds:schemaRef ds:uri="http://schemas.microsoft.com/sharepoint/v3/contenttype/forms"/>
-  </ds:schemaRefs>
-</ds:datastoreItem>
 </file>
</xml_diff>